<commit_message>
Version finale FINALE ( la finale )
</commit_message>
<xml_diff>
--- a/Presentation.pptx
+++ b/Presentation.pptx
@@ -7262,7 +7262,24 @@
                 <a:ea typeface="+mn-ea"/>
                 <a:cs typeface="+mn-cs"/>
               </a:rPr>
-              <a:t> Outils</a:t>
+              <a:t> </a:t>
+            </a:r>
+            <a:r>
+              <a:rPr kumimoji="0" lang="fr-FR" sz="4000" b="1" i="0" u="none" strike="noStrike" kern="1200" cap="none" spc="0" normalizeH="0" baseline="0" noProof="0" dirty="0" smtClean="0">
+                <a:ln>
+                  <a:noFill/>
+                </a:ln>
+                <a:solidFill>
+                  <a:prstClr val="black"/>
+                </a:solidFill>
+                <a:effectLst/>
+                <a:uLnTx/>
+                <a:uFillTx/>
+                <a:latin typeface="Calibri" panose="020F0502020204030204"/>
+                <a:ea typeface="+mn-ea"/>
+                <a:cs typeface="+mn-cs"/>
+              </a:rPr>
+              <a:t>Outils sélectionnés</a:t>
             </a:r>
             <a:endParaRPr kumimoji="0" lang="fr-FR" sz="4000" b="1" i="0" u="none" strike="noStrike" kern="1200" cap="none" spc="0" normalizeH="0" baseline="0" noProof="0" dirty="0">
               <a:ln>
@@ -10601,7 +10618,24 @@
                 <a:ea typeface="+mn-ea"/>
                 <a:cs typeface="+mn-cs"/>
               </a:rPr>
-              <a:t> Outils</a:t>
+              <a:t> </a:t>
+            </a:r>
+            <a:r>
+              <a:rPr kumimoji="0" lang="fr-FR" sz="4000" b="1" i="0" u="none" strike="noStrike" kern="1200" cap="none" spc="0" normalizeH="0" baseline="0" noProof="0" dirty="0" smtClean="0">
+                <a:ln>
+                  <a:noFill/>
+                </a:ln>
+                <a:solidFill>
+                  <a:prstClr val="black"/>
+                </a:solidFill>
+                <a:effectLst/>
+                <a:uLnTx/>
+                <a:uFillTx/>
+                <a:latin typeface="Calibri" panose="020F0502020204030204"/>
+                <a:ea typeface="+mn-ea"/>
+                <a:cs typeface="+mn-cs"/>
+              </a:rPr>
+              <a:t>Outils sélectionnés</a:t>
             </a:r>
             <a:endParaRPr kumimoji="0" lang="fr-FR" sz="4000" b="1" i="0" u="none" strike="noStrike" kern="1200" cap="none" spc="0" normalizeH="0" baseline="0" noProof="0" dirty="0">
               <a:ln>
@@ -10912,8 +10946,8 @@
         </p:nvSpPr>
         <p:spPr>
           <a:xfrm>
-            <a:off x="229538" y="219081"/>
-            <a:ext cx="6815328" cy="707886"/>
+            <a:off x="229537" y="219081"/>
+            <a:ext cx="8027771" cy="707886"/>
           </a:xfrm>
           <a:prstGeom prst="rect">
             <a:avLst/>
@@ -10944,7 +10978,11 @@
             </a:r>
             <a:r>
               <a:rPr lang="fr-FR" sz="4000" b="1" dirty="0" smtClean="0"/>
-              <a:t> ITIL</a:t>
+              <a:t> </a:t>
+            </a:r>
+            <a:r>
+              <a:rPr lang="fr-FR" sz="4000" b="1" dirty="0" smtClean="0"/>
+              <a:t>ITIL : présentation générale</a:t>
             </a:r>
             <a:endParaRPr lang="fr-FR" sz="4000" b="1" dirty="0"/>
           </a:p>
@@ -12384,7 +12422,7 @@
         <p:spPr>
           <a:xfrm>
             <a:off x="229538" y="219081"/>
-            <a:ext cx="6815328" cy="707886"/>
+            <a:ext cx="8352320" cy="707886"/>
           </a:xfrm>
           <a:prstGeom prst="rect">
             <a:avLst/>
@@ -12415,7 +12453,11 @@
             </a:r>
             <a:r>
               <a:rPr lang="fr-FR" sz="4000" b="1" dirty="0" smtClean="0"/>
-              <a:t> ITIL</a:t>
+              <a:t> </a:t>
+            </a:r>
+            <a:r>
+              <a:rPr lang="fr-FR" sz="4000" b="1" dirty="0" smtClean="0"/>
+              <a:t>ITIL : présentation générale</a:t>
             </a:r>
             <a:endParaRPr lang="fr-FR" sz="4000" b="1" dirty="0"/>
           </a:p>
@@ -13509,7 +13551,7 @@
         <p:spPr>
           <a:xfrm>
             <a:off x="229538" y="219081"/>
-            <a:ext cx="6815328" cy="707886"/>
+            <a:ext cx="7695262" cy="707886"/>
           </a:xfrm>
           <a:prstGeom prst="rect">
             <a:avLst/>
@@ -13540,7 +13582,11 @@
             </a:r>
             <a:r>
               <a:rPr lang="fr-FR" sz="4000" b="1" dirty="0" smtClean="0"/>
-              <a:t> ITIL</a:t>
+              <a:t> </a:t>
+            </a:r>
+            <a:r>
+              <a:rPr lang="fr-FR" sz="4000" b="1" dirty="0" smtClean="0"/>
+              <a:t>ITIL : principes directeurs</a:t>
             </a:r>
             <a:endParaRPr lang="fr-FR" sz="4000" b="1" dirty="0"/>
           </a:p>
@@ -14904,8 +14950,8 @@
         </p:nvSpPr>
         <p:spPr>
           <a:xfrm>
-            <a:off x="229538" y="219081"/>
-            <a:ext cx="6815328" cy="707886"/>
+            <a:off x="229537" y="219081"/>
+            <a:ext cx="7676789" cy="707886"/>
           </a:xfrm>
           <a:prstGeom prst="rect">
             <a:avLst/>
@@ -14936,7 +14982,11 @@
             </a:r>
             <a:r>
               <a:rPr lang="fr-FR" sz="4000" b="1" dirty="0" smtClean="0"/>
-              <a:t> ITIL</a:t>
+              <a:t> </a:t>
+            </a:r>
+            <a:r>
+              <a:rPr lang="fr-FR" sz="4000" b="1" dirty="0" smtClean="0"/>
+              <a:t>ITIL : principes directeurs</a:t>
             </a:r>
             <a:endParaRPr lang="fr-FR" sz="4000" b="1" dirty="0"/>
           </a:p>
@@ -16297,7 +16347,11 @@
             </a:r>
             <a:r>
               <a:rPr lang="fr-FR" sz="4000" b="1" dirty="0" smtClean="0"/>
-              <a:t> ITIL</a:t>
+              <a:t> </a:t>
+            </a:r>
+            <a:r>
+              <a:rPr lang="fr-FR" sz="4000" b="1" dirty="0" smtClean="0"/>
+              <a:t>ITIL : pratiques</a:t>
             </a:r>
             <a:endParaRPr lang="fr-FR" sz="4000" b="1" dirty="0"/>
           </a:p>
@@ -17198,7 +17252,11 @@
             </a:r>
             <a:r>
               <a:rPr lang="fr-FR" sz="4000" b="1" dirty="0" smtClean="0"/>
-              <a:t> ITIL</a:t>
+              <a:t> </a:t>
+            </a:r>
+            <a:r>
+              <a:rPr lang="fr-FR" sz="4000" b="1" dirty="0" smtClean="0"/>
+              <a:t>ITIL : pratiques</a:t>
             </a:r>
             <a:endParaRPr lang="fr-FR" sz="4000" b="1" dirty="0"/>
           </a:p>
@@ -24631,7 +24689,11 @@
           <a:p>
             <a:r>
               <a:rPr lang="fr-FR" sz="2000" dirty="0" smtClean="0"/>
-              <a:t>Alice RIVIERE</a:t>
+              <a:t>Alice </a:t>
+            </a:r>
+            <a:r>
+              <a:rPr lang="fr-FR" sz="2000" dirty="0" smtClean="0"/>
+              <a:t>RIVIERE</a:t>
             </a:r>
           </a:p>
           <a:p>
@@ -30674,7 +30736,7 @@
         <p:spPr>
           <a:xfrm>
             <a:off x="6940076" y="4659508"/>
-            <a:ext cx="4430486" cy="1323439"/>
+            <a:ext cx="4430486" cy="1631216"/>
           </a:xfrm>
           <a:prstGeom prst="rect">
             <a:avLst/>
@@ -30727,6 +30789,13 @@
             <a:r>
               <a:rPr lang="fr-FR" sz="2000" b="1" dirty="0" smtClean="0"/>
               <a:t>industrielles</a:t>
+            </a:r>
+          </a:p>
+          <a:p>
+            <a:pPr algn="ctr"/>
+            <a:r>
+              <a:rPr lang="fr-FR" sz="2000" b="1" dirty="0" smtClean="0"/>
+              <a:t>Client et User</a:t>
             </a:r>
             <a:endParaRPr lang="fr-FR" sz="2000" b="1" dirty="0"/>
           </a:p>
@@ -30936,9 +31005,24 @@
           <a:prstGeom prst="rect">
             <a:avLst/>
           </a:prstGeom>
-          <a:solidFill>
-            <a:schemeClr val="bg1"/>
-          </a:solidFill>
+          <a:gradFill flip="none" rotWithShape="1">
+            <a:gsLst>
+              <a:gs pos="0">
+                <a:srgbClr val="FC0769"/>
+              </a:gs>
+              <a:gs pos="50000">
+                <a:srgbClr val="C7688E"/>
+              </a:gs>
+              <a:gs pos="100000">
+                <a:schemeClr val="bg1">
+                  <a:shade val="100000"/>
+                  <a:satMod val="115000"/>
+                </a:schemeClr>
+              </a:gs>
+            </a:gsLst>
+            <a:lin ang="10800000" scaled="1"/>
+            <a:tileRect/>
+          </a:gradFill>
           <a:ln>
             <a:solidFill>
               <a:schemeClr val="tx1"/>
@@ -30967,17 +31051,27 @@
           <a:p>
             <a:r>
               <a:rPr lang="fr-FR" sz="2800" b="1" dirty="0" smtClean="0"/>
-              <a:t>Partie 2 : Outils</a:t>
-            </a:r>
-          </a:p>
-          <a:p>
+              <a:t>Partie 2 : </a:t>
+            </a:r>
+            <a:r>
+              <a:rPr lang="fr-FR" sz="2800" b="1" dirty="0" smtClean="0"/>
+              <a:t>Outils sélectionnés</a:t>
+            </a:r>
             <a:endParaRPr lang="fr-FR" sz="2800" b="1" dirty="0" smtClean="0"/>
           </a:p>
           <a:p>
+            <a:endParaRPr lang="fr-FR" sz="2800" b="1" dirty="0" smtClean="0"/>
+          </a:p>
+          <a:p>
             <a:r>
               <a:rPr lang="fr-FR" sz="2800" b="1" dirty="0" smtClean="0"/>
-              <a:t>Partie 3 : ITIL/SCRUM</a:t>
-            </a:r>
+              <a:t>Partie 3 </a:t>
+            </a:r>
+            <a:r>
+              <a:rPr lang="fr-FR" sz="2800" b="1" dirty="0" smtClean="0"/>
+              <a:t>: Préceptes ITIL/SCRUM appliqués</a:t>
+            </a:r>
+            <a:endParaRPr lang="fr-FR" sz="2800" b="1" dirty="0" smtClean="0"/>
           </a:p>
           <a:p>
             <a:endParaRPr lang="fr-FR" sz="2800" b="1" dirty="0" smtClean="0"/>
@@ -31875,6 +31969,88 @@
           </a:prstGeom>
         </p:spPr>
       </p:pic>
+      <p:sp>
+        <p:nvSpPr>
+          <p:cNvPr id="3" name="Rectangle 2"/>
+          <p:cNvSpPr/>
+          <p:nvPr/>
+        </p:nvSpPr>
+        <p:spPr>
+          <a:xfrm>
+            <a:off x="4552950" y="5210175"/>
+            <a:ext cx="947738" cy="781050"/>
+          </a:xfrm>
+          <a:prstGeom prst="rect">
+            <a:avLst/>
+          </a:prstGeom>
+          <a:solidFill>
+            <a:schemeClr val="bg1"/>
+          </a:solidFill>
+          <a:ln>
+            <a:noFill/>
+          </a:ln>
+        </p:spPr>
+        <p:style>
+          <a:lnRef idx="2">
+            <a:schemeClr val="accent1">
+              <a:shade val="50000"/>
+            </a:schemeClr>
+          </a:lnRef>
+          <a:fillRef idx="1">
+            <a:schemeClr val="accent1"/>
+          </a:fillRef>
+          <a:effectRef idx="0">
+            <a:schemeClr val="accent1"/>
+          </a:effectRef>
+          <a:fontRef idx="minor">
+            <a:schemeClr val="lt1"/>
+          </a:fontRef>
+        </p:style>
+        <p:txBody>
+          <a:bodyPr rtlCol="0" anchor="ctr"/>
+          <a:lstStyle/>
+          <a:p>
+            <a:pPr algn="ctr"/>
+            <a:endParaRPr lang="fr-FR" dirty="0"/>
+          </a:p>
+        </p:txBody>
+      </p:sp>
+      <p:sp>
+        <p:nvSpPr>
+          <p:cNvPr id="9" name="ZoneTexte 8"/>
+          <p:cNvSpPr txBox="1"/>
+          <p:nvPr/>
+        </p:nvSpPr>
+        <p:spPr>
+          <a:xfrm>
+            <a:off x="4462734" y="5138340"/>
+            <a:ext cx="681597" cy="523220"/>
+          </a:xfrm>
+          <a:prstGeom prst="rect">
+            <a:avLst/>
+          </a:prstGeom>
+          <a:noFill/>
+        </p:spPr>
+        <p:txBody>
+          <a:bodyPr wrap="none" rtlCol="0">
+            <a:spAutoFit/>
+          </a:bodyPr>
+          <a:lstStyle/>
+          <a:p>
+            <a:r>
+              <a:rPr lang="fr-FR" sz="1400" b="1" dirty="0" smtClean="0"/>
+              <a:t>ITIL V4</a:t>
+            </a:r>
+          </a:p>
+          <a:p>
+            <a:r>
+              <a:rPr lang="fr-FR" sz="1400" b="1" dirty="0" smtClean="0"/>
+              <a:t>(2019)</a:t>
+            </a:r>
+            <a:endParaRPr lang="fr-FR" sz="1400" b="1" dirty="0"/>
+          </a:p>
+        </p:txBody>
+      </p:sp>
     </p:spTree>
     <p:extLst>
       <p:ext uri="{BB962C8B-B14F-4D97-AF65-F5344CB8AC3E}">
@@ -36575,7 +36751,16 @@
                 <a:ea typeface="+mn-ea"/>
                 <a:cs typeface="+mn-cs"/>
               </a:rPr>
-              <a:t> Outils</a:t>
+              <a:t> </a:t>
+            </a:r>
+            <a:r>
+              <a:rPr lang="fr-FR" sz="4000" b="1" dirty="0" smtClean="0">
+                <a:solidFill>
+                  <a:prstClr val="black"/>
+                </a:solidFill>
+                <a:latin typeface="Calibri" panose="020F0502020204030204"/>
+              </a:rPr>
+              <a:t>Présentation d’un « sprint »</a:t>
             </a:r>
             <a:endParaRPr kumimoji="0" lang="fr-FR" sz="4000" b="1" i="0" u="none" strike="noStrike" kern="1200" cap="none" spc="0" normalizeH="0" baseline="0" noProof="0" dirty="0">
               <a:ln>

</xml_diff>

<commit_message>
Dernière version finale de la fin !
</commit_message>
<xml_diff>
--- a/Presentation.pptx
+++ b/Presentation.pptx
@@ -7262,24 +7262,7 @@
                 <a:ea typeface="+mn-ea"/>
                 <a:cs typeface="+mn-cs"/>
               </a:rPr>
-              <a:t> </a:t>
-            </a:r>
-            <a:r>
-              <a:rPr kumimoji="0" lang="fr-FR" sz="4000" b="1" i="0" u="none" strike="noStrike" kern="1200" cap="none" spc="0" normalizeH="0" baseline="0" noProof="0" dirty="0" smtClean="0">
-                <a:ln>
-                  <a:noFill/>
-                </a:ln>
-                <a:solidFill>
-                  <a:prstClr val="black"/>
-                </a:solidFill>
-                <a:effectLst/>
-                <a:uLnTx/>
-                <a:uFillTx/>
-                <a:latin typeface="Calibri" panose="020F0502020204030204"/>
-                <a:ea typeface="+mn-ea"/>
-                <a:cs typeface="+mn-cs"/>
-              </a:rPr>
-              <a:t>Outils sélectionnés</a:t>
+              <a:t> Outils sélectionnés</a:t>
             </a:r>
             <a:endParaRPr kumimoji="0" lang="fr-FR" sz="4000" b="1" i="0" u="none" strike="noStrike" kern="1200" cap="none" spc="0" normalizeH="0" baseline="0" noProof="0" dirty="0">
               <a:ln>
@@ -10618,24 +10601,7 @@
                 <a:ea typeface="+mn-ea"/>
                 <a:cs typeface="+mn-cs"/>
               </a:rPr>
-              <a:t> </a:t>
-            </a:r>
-            <a:r>
-              <a:rPr kumimoji="0" lang="fr-FR" sz="4000" b="1" i="0" u="none" strike="noStrike" kern="1200" cap="none" spc="0" normalizeH="0" baseline="0" noProof="0" dirty="0" smtClean="0">
-                <a:ln>
-                  <a:noFill/>
-                </a:ln>
-                <a:solidFill>
-                  <a:prstClr val="black"/>
-                </a:solidFill>
-                <a:effectLst/>
-                <a:uLnTx/>
-                <a:uFillTx/>
-                <a:latin typeface="Calibri" panose="020F0502020204030204"/>
-                <a:ea typeface="+mn-ea"/>
-                <a:cs typeface="+mn-cs"/>
-              </a:rPr>
-              <a:t>Outils sélectionnés</a:t>
+              <a:t> Outils sélectionnés</a:t>
             </a:r>
             <a:endParaRPr kumimoji="0" lang="fr-FR" sz="4000" b="1" i="0" u="none" strike="noStrike" kern="1200" cap="none" spc="0" normalizeH="0" baseline="0" noProof="0" dirty="0">
               <a:ln>
@@ -10978,11 +10944,7 @@
             </a:r>
             <a:r>
               <a:rPr lang="fr-FR" sz="4000" b="1" dirty="0" smtClean="0"/>
-              <a:t> </a:t>
-            </a:r>
-            <a:r>
-              <a:rPr lang="fr-FR" sz="4000" b="1" dirty="0" smtClean="0"/>
-              <a:t>ITIL : présentation générale</a:t>
+              <a:t> ITIL : présentation générale</a:t>
             </a:r>
             <a:endParaRPr lang="fr-FR" sz="4000" b="1" dirty="0"/>
           </a:p>
@@ -12453,11 +12415,7 @@
             </a:r>
             <a:r>
               <a:rPr lang="fr-FR" sz="4000" b="1" dirty="0" smtClean="0"/>
-              <a:t> </a:t>
-            </a:r>
-            <a:r>
-              <a:rPr lang="fr-FR" sz="4000" b="1" dirty="0" smtClean="0"/>
-              <a:t>ITIL : présentation générale</a:t>
+              <a:t> ITIL : présentation générale</a:t>
             </a:r>
             <a:endParaRPr lang="fr-FR" sz="4000" b="1" dirty="0"/>
           </a:p>
@@ -13582,11 +13540,7 @@
             </a:r>
             <a:r>
               <a:rPr lang="fr-FR" sz="4000" b="1" dirty="0" smtClean="0"/>
-              <a:t> </a:t>
-            </a:r>
-            <a:r>
-              <a:rPr lang="fr-FR" sz="4000" b="1" dirty="0" smtClean="0"/>
-              <a:t>ITIL : principes directeurs</a:t>
+              <a:t> ITIL : principes directeurs</a:t>
             </a:r>
             <a:endParaRPr lang="fr-FR" sz="4000" b="1" dirty="0"/>
           </a:p>
@@ -14982,11 +14936,7 @@
             </a:r>
             <a:r>
               <a:rPr lang="fr-FR" sz="4000" b="1" dirty="0" smtClean="0"/>
-              <a:t> </a:t>
-            </a:r>
-            <a:r>
-              <a:rPr lang="fr-FR" sz="4000" b="1" dirty="0" smtClean="0"/>
-              <a:t>ITIL : principes directeurs</a:t>
+              <a:t> ITIL : principes directeurs</a:t>
             </a:r>
             <a:endParaRPr lang="fr-FR" sz="4000" b="1" dirty="0"/>
           </a:p>
@@ -16347,11 +16297,7 @@
             </a:r>
             <a:r>
               <a:rPr lang="fr-FR" sz="4000" b="1" dirty="0" smtClean="0"/>
-              <a:t> </a:t>
-            </a:r>
-            <a:r>
-              <a:rPr lang="fr-FR" sz="4000" b="1" dirty="0" smtClean="0"/>
-              <a:t>ITIL : pratiques</a:t>
+              <a:t> ITIL : pratiques</a:t>
             </a:r>
             <a:endParaRPr lang="fr-FR" sz="4000" b="1" dirty="0"/>
           </a:p>
@@ -17252,11 +17198,7 @@
             </a:r>
             <a:r>
               <a:rPr lang="fr-FR" sz="4000" b="1" dirty="0" smtClean="0"/>
-              <a:t> </a:t>
-            </a:r>
-            <a:r>
-              <a:rPr lang="fr-FR" sz="4000" b="1" dirty="0" smtClean="0"/>
-              <a:t>ITIL : pratiques</a:t>
+              <a:t> ITIL : pratiques</a:t>
             </a:r>
             <a:endParaRPr lang="fr-FR" sz="4000" b="1" dirty="0"/>
           </a:p>
@@ -23847,21 +23789,22 @@
               <a:defRPr/>
             </a:pPr>
             <a:r>
-              <a:rPr kumimoji="0" lang="fr-FR" sz="4000" b="1" i="0" u="none" strike="noStrike" kern="1200" cap="none" spc="0" normalizeH="0" baseline="0" noProof="0" dirty="0" smtClean="0">
-                <a:ln>
-                  <a:noFill/>
-                </a:ln>
+              <a:rPr lang="fr-FR" sz="4000" b="1" dirty="0" smtClean="0">
                 <a:solidFill>
                   <a:srgbClr val="F70F6C"/>
                 </a:solidFill>
-                <a:effectLst/>
-                <a:uLnTx/>
-                <a:uFillTx/>
                 <a:latin typeface="Calibri" panose="020F0502020204030204"/>
-                <a:ea typeface="+mn-ea"/>
-                <a:cs typeface="+mn-cs"/>
               </a:rPr>
-              <a:t>CONCLUSION/PERSPECTIVES</a:t>
+              <a:t>SUPPORT </a:t>
+            </a:r>
+            <a:r>
+              <a:rPr lang="fr-FR" sz="4000" b="1" dirty="0" err="1" smtClean="0">
+                <a:solidFill>
+                  <a:srgbClr val="F70F6C"/>
+                </a:solidFill>
+                <a:latin typeface="Calibri" panose="020F0502020204030204"/>
+              </a:rPr>
+              <a:t>QRcode</a:t>
             </a:r>
             <a:endParaRPr kumimoji="0" lang="fr-FR" sz="4000" b="1" i="0" u="none" strike="noStrike" kern="1200" cap="none" spc="0" normalizeH="0" baseline="0" noProof="0" dirty="0">
               <a:ln>
@@ -23889,7 +23832,7 @@
         <p:spPr>
           <a:xfrm>
             <a:off x="549293" y="1802391"/>
-            <a:ext cx="4278086" cy="4401205"/>
+            <a:ext cx="4278086" cy="5693866"/>
           </a:xfrm>
           <a:prstGeom prst="rect">
             <a:avLst/>
@@ -24019,6 +23962,106 @@
               <a:defRPr/>
             </a:pPr>
             <a:r>
+              <a:rPr kumimoji="0" lang="fr-FR" sz="2400" b="1" i="0" u="none" strike="noStrike" kern="1200" cap="none" spc="0" normalizeH="0" baseline="0" noProof="0" dirty="0" smtClean="0">
+                <a:ln>
+                  <a:noFill/>
+                </a:ln>
+                <a:solidFill>
+                  <a:prstClr val="black"/>
+                </a:solidFill>
+                <a:effectLst/>
+                <a:uLnTx/>
+                <a:uFillTx/>
+                <a:latin typeface="Calibri" panose="020F0502020204030204"/>
+                <a:ea typeface="+mn-ea"/>
+                <a:cs typeface="+mn-cs"/>
+              </a:rPr>
+              <a:t>Merci de votre attention</a:t>
+            </a:r>
+            <a:endParaRPr kumimoji="0" lang="fr-FR" sz="2400" b="1" i="0" u="none" strike="noStrike" kern="1200" cap="none" spc="0" normalizeH="0" baseline="0" noProof="0" dirty="0">
+              <a:ln>
+                <a:noFill/>
+              </a:ln>
+              <a:solidFill>
+                <a:prstClr val="black"/>
+              </a:solidFill>
+              <a:effectLst/>
+              <a:uLnTx/>
+              <a:uFillTx/>
+              <a:latin typeface="Calibri" panose="020F0502020204030204"/>
+              <a:ea typeface="+mn-ea"/>
+              <a:cs typeface="+mn-cs"/>
+            </a:endParaRPr>
+          </a:p>
+          <a:p>
+            <a:pPr marL="0" marR="0" lvl="0" indent="0" algn="ctr" defTabSz="914400" rtl="0" eaLnBrk="1" fontAlgn="auto" latinLnBrk="0" hangingPunct="1">
+              <a:lnSpc>
+                <a:spcPct val="100000"/>
+              </a:lnSpc>
+              <a:spcBef>
+                <a:spcPts val="0"/>
+              </a:spcBef>
+              <a:spcAft>
+                <a:spcPts val="0"/>
+              </a:spcAft>
+              <a:buClrTx/>
+              <a:buSzTx/>
+              <a:buFontTx/>
+              <a:buNone/>
+              <a:tabLst/>
+              <a:defRPr/>
+            </a:pPr>
+            <a:endParaRPr kumimoji="0" lang="fr-FR" sz="2400" b="1" i="0" u="none" strike="noStrike" kern="1200" cap="none" spc="0" normalizeH="0" baseline="0" noProof="0" dirty="0" smtClean="0">
+              <a:ln>
+                <a:noFill/>
+              </a:ln>
+              <a:solidFill>
+                <a:prstClr val="black"/>
+              </a:solidFill>
+              <a:effectLst/>
+              <a:uLnTx/>
+              <a:uFillTx/>
+              <a:latin typeface="Calibri" panose="020F0502020204030204"/>
+              <a:ea typeface="+mn-ea"/>
+              <a:cs typeface="+mn-cs"/>
+            </a:endParaRPr>
+          </a:p>
+          <a:p>
+            <a:pPr marL="0" marR="0" lvl="0" indent="0" algn="ctr" defTabSz="914400" rtl="0" eaLnBrk="1" fontAlgn="auto" latinLnBrk="0" hangingPunct="1">
+              <a:lnSpc>
+                <a:spcPct val="100000"/>
+              </a:lnSpc>
+              <a:spcBef>
+                <a:spcPts val="0"/>
+              </a:spcBef>
+              <a:spcAft>
+                <a:spcPts val="0"/>
+              </a:spcAft>
+              <a:buClrTx/>
+              <a:buSzTx/>
+              <a:buFontTx/>
+              <a:buNone/>
+              <a:tabLst/>
+              <a:defRPr/>
+            </a:pPr>
+            <a:r>
+              <a:rPr kumimoji="0" lang="fr-FR" sz="2400" b="1" i="0" u="none" strike="noStrike" kern="1200" cap="none" spc="0" normalizeH="0" baseline="0" noProof="0" dirty="0" smtClean="0">
+                <a:ln>
+                  <a:noFill/>
+                </a:ln>
+                <a:solidFill>
+                  <a:prstClr val="black"/>
+                </a:solidFill>
+                <a:effectLst/>
+                <a:uLnTx/>
+                <a:uFillTx/>
+                <a:latin typeface="Calibri" panose="020F0502020204030204"/>
+                <a:ea typeface="+mn-ea"/>
+                <a:cs typeface="+mn-cs"/>
+              </a:rPr>
+              <a:t>Vous pouvez retrouver et télécharger cette présentation sur GITHUB en passant par ce QR Code</a:t>
+            </a:r>
+            <a:r>
               <a:rPr kumimoji="0" lang="fr-FR" sz="2000" b="1" i="0" u="none" strike="noStrike" kern="1200" cap="none" spc="0" normalizeH="0" baseline="0" noProof="0" dirty="0" smtClean="0">
                 <a:ln>
                   <a:noFill/>
@@ -24033,21 +24076,32 @@
                 <a:ea typeface="+mn-ea"/>
                 <a:cs typeface="+mn-cs"/>
               </a:rPr>
-              <a:t>Merci de votre attention</a:t>
-            </a:r>
-            <a:endParaRPr kumimoji="0" lang="fr-FR" sz="2000" b="1" i="0" u="none" strike="noStrike" kern="1200" cap="none" spc="0" normalizeH="0" baseline="0" noProof="0" dirty="0">
-              <a:ln>
-                <a:noFill/>
-              </a:ln>
+              <a:t>.</a:t>
+            </a:r>
+          </a:p>
+          <a:p>
+            <a:pPr marL="0" marR="0" lvl="0" indent="0" algn="ctr" defTabSz="914400" rtl="0" eaLnBrk="1" fontAlgn="auto" latinLnBrk="0" hangingPunct="1">
+              <a:lnSpc>
+                <a:spcPct val="100000"/>
+              </a:lnSpc>
+              <a:spcBef>
+                <a:spcPts val="0"/>
+              </a:spcBef>
+              <a:spcAft>
+                <a:spcPts val="0"/>
+              </a:spcAft>
+              <a:buClrTx/>
+              <a:buSzTx/>
+              <a:buFontTx/>
+              <a:buNone/>
+              <a:tabLst/>
+              <a:defRPr/>
+            </a:pPr>
+            <a:endParaRPr lang="fr-FR" sz="2000" b="1" dirty="0">
               <a:solidFill>
                 <a:prstClr val="black"/>
               </a:solidFill>
-              <a:effectLst/>
-              <a:uLnTx/>
-              <a:uFillTx/>
               <a:latin typeface="Calibri" panose="020F0502020204030204"/>
-              <a:ea typeface="+mn-ea"/>
-              <a:cs typeface="+mn-cs"/>
             </a:endParaRPr>
           </a:p>
           <a:p>
@@ -24084,42 +24138,6 @@
             </a:endParaRPr>
           </a:p>
           <a:p>
-            <a:pPr marL="0" marR="0" lvl="0" indent="0" algn="ctr" defTabSz="914400" rtl="0" eaLnBrk="1" fontAlgn="auto" latinLnBrk="0" hangingPunct="1">
-              <a:lnSpc>
-                <a:spcPct val="100000"/>
-              </a:lnSpc>
-              <a:spcBef>
-                <a:spcPts val="0"/>
-              </a:spcBef>
-              <a:spcAft>
-                <a:spcPts val="0"/>
-              </a:spcAft>
-              <a:buClrTx/>
-              <a:buSzTx/>
-              <a:buFontTx/>
-              <a:buNone/>
-              <a:tabLst/>
-              <a:defRPr/>
-            </a:pPr>
-            <a:r>
-              <a:rPr kumimoji="0" lang="fr-FR" sz="2000" b="1" i="0" u="none" strike="noStrike" kern="1200" cap="none" spc="0" normalizeH="0" baseline="0" noProof="0" dirty="0" smtClean="0">
-                <a:ln>
-                  <a:noFill/>
-                </a:ln>
-                <a:solidFill>
-                  <a:prstClr val="black"/>
-                </a:solidFill>
-                <a:effectLst/>
-                <a:uLnTx/>
-                <a:uFillTx/>
-                <a:latin typeface="Calibri" panose="020F0502020204030204"/>
-                <a:ea typeface="+mn-ea"/>
-                <a:cs typeface="+mn-cs"/>
-              </a:rPr>
-              <a:t>Vous pouvez retrouver et télécharger cette présentation sur GITHUB en passant par ce QR Code.</a:t>
-            </a:r>
-          </a:p>
-          <a:p>
             <a:pPr marL="0" marR="0" lvl="0" indent="0" algn="l" defTabSz="914400" rtl="0" eaLnBrk="1" fontAlgn="auto" latinLnBrk="0" hangingPunct="1">
               <a:lnSpc>
                 <a:spcPct val="100000"/>
@@ -24426,6 +24444,36 @@
           </a:prstGeom>
         </p:spPr>
       </p:pic>
+      <p:sp>
+        <p:nvSpPr>
+          <p:cNvPr id="6" name="ZoneTexte 5"/>
+          <p:cNvSpPr txBox="1"/>
+          <p:nvPr/>
+        </p:nvSpPr>
+        <p:spPr>
+          <a:xfrm>
+            <a:off x="10096413" y="6018930"/>
+            <a:ext cx="1033040" cy="369332"/>
+          </a:xfrm>
+          <a:prstGeom prst="rect">
+            <a:avLst/>
+          </a:prstGeom>
+          <a:noFill/>
+        </p:spPr>
+        <p:txBody>
+          <a:bodyPr wrap="none" rtlCol="0">
+            <a:spAutoFit/>
+          </a:bodyPr>
+          <a:lstStyle/>
+          <a:p>
+            <a:r>
+              <a:rPr lang="fr-FR" dirty="0" smtClean="0"/>
+              <a:t>Unitag.io</a:t>
+            </a:r>
+            <a:endParaRPr lang="fr-FR" dirty="0"/>
+          </a:p>
+        </p:txBody>
+      </p:sp>
     </p:spTree>
     <p:extLst>
       <p:ext uri="{BB962C8B-B14F-4D97-AF65-F5344CB8AC3E}">
@@ -24689,11 +24737,7 @@
           <a:p>
             <a:r>
               <a:rPr lang="fr-FR" sz="2000" dirty="0" smtClean="0"/>
-              <a:t>Alice </a:t>
-            </a:r>
-            <a:r>
-              <a:rPr lang="fr-FR" sz="2000" dirty="0" smtClean="0"/>
-              <a:t>RIVIERE</a:t>
+              <a:t>Alice RIVIERE</a:t>
             </a:r>
           </a:p>
           <a:p>
@@ -31051,27 +31095,17 @@
           <a:p>
             <a:r>
               <a:rPr lang="fr-FR" sz="2800" b="1" dirty="0" smtClean="0"/>
-              <a:t>Partie 2 : </a:t>
-            </a:r>
+              <a:t>Partie 2 : Outils sélectionnés</a:t>
+            </a:r>
+          </a:p>
+          <a:p>
+            <a:endParaRPr lang="fr-FR" sz="2800" b="1" dirty="0" smtClean="0"/>
+          </a:p>
+          <a:p>
             <a:r>
               <a:rPr lang="fr-FR" sz="2800" b="1" dirty="0" smtClean="0"/>
-              <a:t>Outils sélectionnés</a:t>
-            </a:r>
-            <a:endParaRPr lang="fr-FR" sz="2800" b="1" dirty="0" smtClean="0"/>
-          </a:p>
-          <a:p>
-            <a:endParaRPr lang="fr-FR" sz="2800" b="1" dirty="0" smtClean="0"/>
-          </a:p>
-          <a:p>
-            <a:r>
-              <a:rPr lang="fr-FR" sz="2800" b="1" dirty="0" smtClean="0"/>
-              <a:t>Partie 3 </a:t>
-            </a:r>
-            <a:r>
-              <a:rPr lang="fr-FR" sz="2800" b="1" dirty="0" smtClean="0"/>
-              <a:t>: Préceptes ITIL/SCRUM appliqués</a:t>
-            </a:r>
-            <a:endParaRPr lang="fr-FR" sz="2800" b="1" dirty="0" smtClean="0"/>
+              <a:t>Partie 3 : Préceptes ITIL/SCRUM appliqués</a:t>
+            </a:r>
           </a:p>
           <a:p>
             <a:endParaRPr lang="fr-FR" sz="2800" b="1" dirty="0" smtClean="0"/>

</xml_diff>